<commit_message>
adding cv, projects, assets
</commit_message>
<xml_diff>
--- a/docs/assets/logo.pptx
+++ b/docs/assets/logo.pptx
@@ -208,7 +208,7 @@
           <a:p>
             <a:fld id="{FF23C374-0C65-4915-B41D-098483746107}" type="datetimeFigureOut">
               <a:rPr lang="en-US" smtClean="0"/>
-              <a:t>4/18/2024</a:t>
+              <a:t>4/21/2024</a:t>
             </a:fld>
             <a:endParaRPr lang="en-US"/>
           </a:p>
@@ -706,7 +706,7 @@
           <a:p>
             <a:fld id="{1FE21602-EDCD-47BC-A650-EC68B425F659}" type="datetimeFigureOut">
               <a:rPr lang="en-US" smtClean="0"/>
-              <a:t>4/18/2024</a:t>
+              <a:t>4/21/2024</a:t>
             </a:fld>
             <a:endParaRPr lang="en-US"/>
           </a:p>
@@ -904,7 +904,7 @@
           <a:p>
             <a:fld id="{1FE21602-EDCD-47BC-A650-EC68B425F659}" type="datetimeFigureOut">
               <a:rPr lang="en-US" smtClean="0"/>
-              <a:t>4/18/2024</a:t>
+              <a:t>4/21/2024</a:t>
             </a:fld>
             <a:endParaRPr lang="en-US"/>
           </a:p>
@@ -1112,7 +1112,7 @@
           <a:p>
             <a:fld id="{1FE21602-EDCD-47BC-A650-EC68B425F659}" type="datetimeFigureOut">
               <a:rPr lang="en-US" smtClean="0"/>
-              <a:t>4/18/2024</a:t>
+              <a:t>4/21/2024</a:t>
             </a:fld>
             <a:endParaRPr lang="en-US"/>
           </a:p>
@@ -1310,7 +1310,7 @@
           <a:p>
             <a:fld id="{1FE21602-EDCD-47BC-A650-EC68B425F659}" type="datetimeFigureOut">
               <a:rPr lang="en-US" smtClean="0"/>
-              <a:t>4/18/2024</a:t>
+              <a:t>4/21/2024</a:t>
             </a:fld>
             <a:endParaRPr lang="en-US"/>
           </a:p>
@@ -1585,7 +1585,7 @@
           <a:p>
             <a:fld id="{1FE21602-EDCD-47BC-A650-EC68B425F659}" type="datetimeFigureOut">
               <a:rPr lang="en-US" smtClean="0"/>
-              <a:t>4/18/2024</a:t>
+              <a:t>4/21/2024</a:t>
             </a:fld>
             <a:endParaRPr lang="en-US"/>
           </a:p>
@@ -1850,7 +1850,7 @@
           <a:p>
             <a:fld id="{1FE21602-EDCD-47BC-A650-EC68B425F659}" type="datetimeFigureOut">
               <a:rPr lang="en-US" smtClean="0"/>
-              <a:t>4/18/2024</a:t>
+              <a:t>4/21/2024</a:t>
             </a:fld>
             <a:endParaRPr lang="en-US"/>
           </a:p>
@@ -2262,7 +2262,7 @@
           <a:p>
             <a:fld id="{1FE21602-EDCD-47BC-A650-EC68B425F659}" type="datetimeFigureOut">
               <a:rPr lang="en-US" smtClean="0"/>
-              <a:t>4/18/2024</a:t>
+              <a:t>4/21/2024</a:t>
             </a:fld>
             <a:endParaRPr lang="en-US"/>
           </a:p>
@@ -2403,7 +2403,7 @@
           <a:p>
             <a:fld id="{1FE21602-EDCD-47BC-A650-EC68B425F659}" type="datetimeFigureOut">
               <a:rPr lang="en-US" smtClean="0"/>
-              <a:t>4/18/2024</a:t>
+              <a:t>4/21/2024</a:t>
             </a:fld>
             <a:endParaRPr lang="en-US"/>
           </a:p>
@@ -2516,7 +2516,7 @@
           <a:p>
             <a:fld id="{1FE21602-EDCD-47BC-A650-EC68B425F659}" type="datetimeFigureOut">
               <a:rPr lang="en-US" smtClean="0"/>
-              <a:t>4/18/2024</a:t>
+              <a:t>4/21/2024</a:t>
             </a:fld>
             <a:endParaRPr lang="en-US"/>
           </a:p>
@@ -2827,7 +2827,7 @@
           <a:p>
             <a:fld id="{1FE21602-EDCD-47BC-A650-EC68B425F659}" type="datetimeFigureOut">
               <a:rPr lang="en-US" smtClean="0"/>
-              <a:t>4/18/2024</a:t>
+              <a:t>4/21/2024</a:t>
             </a:fld>
             <a:endParaRPr lang="en-US"/>
           </a:p>
@@ -3115,7 +3115,7 @@
           <a:p>
             <a:fld id="{1FE21602-EDCD-47BC-A650-EC68B425F659}" type="datetimeFigureOut">
               <a:rPr lang="en-US" smtClean="0"/>
-              <a:t>4/18/2024</a:t>
+              <a:t>4/21/2024</a:t>
             </a:fld>
             <a:endParaRPr lang="en-US"/>
           </a:p>
@@ -3356,7 +3356,7 @@
           <a:p>
             <a:fld id="{1FE21602-EDCD-47BC-A650-EC68B425F659}" type="datetimeFigureOut">
               <a:rPr lang="en-US" smtClean="0"/>
-              <a:t>4/18/2024</a:t>
+              <a:t>4/21/2024</a:t>
             </a:fld>
             <a:endParaRPr lang="en-US"/>
           </a:p>
@@ -3775,72 +3775,6 @@
       </p:grpSpPr>
       <p:sp>
         <p:nvSpPr>
-          <p:cNvPr id="5" name="Oval 4">
-            <a:extLst>
-              <a:ext uri="{FF2B5EF4-FFF2-40B4-BE49-F238E27FC236}">
-                <a16:creationId xmlns:a16="http://schemas.microsoft.com/office/drawing/2014/main" id="{C6D214A6-2268-8D9E-AABB-704A9BDB9780}"/>
-              </a:ext>
-            </a:extLst>
-          </p:cNvPr>
-          <p:cNvSpPr>
-            <a:spLocks noChangeAspect="1"/>
-          </p:cNvSpPr>
-          <p:nvPr/>
-        </p:nvSpPr>
-        <p:spPr>
-          <a:xfrm>
-            <a:off x="0" y="304800"/>
-            <a:ext cx="5836920" cy="5836920"/>
-          </a:xfrm>
-          <a:prstGeom prst="ellipse">
-            <a:avLst/>
-          </a:prstGeom>
-          <a:gradFill flip="none" rotWithShape="1">
-            <a:gsLst>
-              <a:gs pos="0">
-                <a:srgbClr val="800000"/>
-              </a:gs>
-              <a:gs pos="23000">
-                <a:srgbClr val="141414"/>
-              </a:gs>
-              <a:gs pos="100000">
-                <a:srgbClr val="003E78"/>
-              </a:gs>
-            </a:gsLst>
-            <a:lin ang="2700000" scaled="1"/>
-            <a:tileRect/>
-          </a:gradFill>
-          <a:ln>
-            <a:noFill/>
-          </a:ln>
-        </p:spPr>
-        <p:style>
-          <a:lnRef idx="2">
-            <a:schemeClr val="accent1">
-              <a:shade val="15000"/>
-            </a:schemeClr>
-          </a:lnRef>
-          <a:fillRef idx="1">
-            <a:schemeClr val="accent1"/>
-          </a:fillRef>
-          <a:effectRef idx="0">
-            <a:schemeClr val="accent1"/>
-          </a:effectRef>
-          <a:fontRef idx="minor">
-            <a:schemeClr val="lt1"/>
-          </a:fontRef>
-        </p:style>
-        <p:txBody>
-          <a:bodyPr rtlCol="0" anchor="ctr"/>
-          <a:lstStyle/>
-          <a:p>
-            <a:pPr algn="ctr"/>
-            <a:endParaRPr lang="en-US" dirty="0"/>
-          </a:p>
-        </p:txBody>
-      </p:sp>
-      <p:sp>
-        <p:nvSpPr>
           <p:cNvPr id="15" name="Rectangle: Rounded Corners 14">
             <a:extLst>
               <a:ext uri="{FF2B5EF4-FFF2-40B4-BE49-F238E27FC236}">
@@ -4122,46 +4056,133 @@
           </a:p>
         </p:txBody>
       </p:sp>
-      <p:sp>
-        <p:nvSpPr>
-          <p:cNvPr id="4" name="TextBox 3">
-            <a:extLst>
-              <a:ext uri="{FF2B5EF4-FFF2-40B4-BE49-F238E27FC236}">
-                <a16:creationId xmlns:a16="http://schemas.microsoft.com/office/drawing/2014/main" id="{0203A0F0-BEAC-7C0E-B83A-90FAC90AC841}"/>
-              </a:ext>
-            </a:extLst>
-          </p:cNvPr>
-          <p:cNvSpPr txBox="1"/>
+      <p:grpSp>
+        <p:nvGrpSpPr>
+          <p:cNvPr id="2" name="Group 1">
+            <a:extLst>
+              <a:ext uri="{FF2B5EF4-FFF2-40B4-BE49-F238E27FC236}">
+                <a16:creationId xmlns:a16="http://schemas.microsoft.com/office/drawing/2014/main" id="{5842C7E5-DD84-68D3-0583-1BE5E05D31C2}"/>
+              </a:ext>
+            </a:extLst>
+          </p:cNvPr>
+          <p:cNvGrpSpPr/>
           <p:nvPr/>
-        </p:nvSpPr>
-        <p:spPr>
+        </p:nvGrpSpPr>
+        <p:grpSpPr>
           <a:xfrm>
-            <a:off x="340873" y="783414"/>
-            <a:ext cx="6509313" cy="4508927"/>
+            <a:off x="132080" y="568960"/>
+            <a:ext cx="6890826" cy="5836920"/>
+            <a:chOff x="0" y="304800"/>
+            <a:chExt cx="6890826" cy="5836920"/>
           </a:xfrm>
-          <a:prstGeom prst="rect">
-            <a:avLst/>
-          </a:prstGeom>
-          <a:noFill/>
-        </p:spPr>
-        <p:txBody>
-          <a:bodyPr wrap="square" rtlCol="0">
-            <a:spAutoFit/>
-          </a:bodyPr>
-          <a:lstStyle/>
-          <a:p>
-            <a:r>
-              <a:rPr lang="en-US" sz="28700" dirty="0">
-                <a:solidFill>
-                  <a:schemeClr val="bg1"/>
-                </a:solidFill>
-                <a:latin typeface="Bookman Old Style" panose="02050604050505020204" pitchFamily="18" charset="0"/>
-              </a:rPr>
-              <a:t>JE</a:t>
-            </a:r>
-          </a:p>
-        </p:txBody>
-      </p:sp>
+        </p:grpSpPr>
+        <p:sp>
+          <p:nvSpPr>
+            <p:cNvPr id="5" name="Oval 4">
+              <a:extLst>
+                <a:ext uri="{FF2B5EF4-FFF2-40B4-BE49-F238E27FC236}">
+                  <a16:creationId xmlns:a16="http://schemas.microsoft.com/office/drawing/2014/main" id="{C6D214A6-2268-8D9E-AABB-704A9BDB9780}"/>
+                </a:ext>
+              </a:extLst>
+            </p:cNvPr>
+            <p:cNvSpPr>
+              <a:spLocks noChangeAspect="1"/>
+            </p:cNvSpPr>
+            <p:nvPr/>
+          </p:nvSpPr>
+          <p:spPr>
+            <a:xfrm>
+              <a:off x="0" y="304800"/>
+              <a:ext cx="5836920" cy="5836920"/>
+            </a:xfrm>
+            <a:prstGeom prst="ellipse">
+              <a:avLst/>
+            </a:prstGeom>
+            <a:gradFill flip="none" rotWithShape="1">
+              <a:gsLst>
+                <a:gs pos="0">
+                  <a:srgbClr val="800000"/>
+                </a:gs>
+                <a:gs pos="23000">
+                  <a:srgbClr val="141414"/>
+                </a:gs>
+                <a:gs pos="100000">
+                  <a:srgbClr val="003E78"/>
+                </a:gs>
+              </a:gsLst>
+              <a:lin ang="2700000" scaled="1"/>
+              <a:tileRect/>
+            </a:gradFill>
+            <a:ln>
+              <a:noFill/>
+            </a:ln>
+          </p:spPr>
+          <p:style>
+            <a:lnRef idx="2">
+              <a:schemeClr val="accent1">
+                <a:shade val="15000"/>
+              </a:schemeClr>
+            </a:lnRef>
+            <a:fillRef idx="1">
+              <a:schemeClr val="accent1"/>
+            </a:fillRef>
+            <a:effectRef idx="0">
+              <a:schemeClr val="accent1"/>
+            </a:effectRef>
+            <a:fontRef idx="minor">
+              <a:schemeClr val="lt1"/>
+            </a:fontRef>
+          </p:style>
+          <p:txBody>
+            <a:bodyPr rtlCol="0" anchor="ctr"/>
+            <a:lstStyle/>
+            <a:p>
+              <a:pPr algn="ctr"/>
+              <a:endParaRPr lang="en-US" dirty="0"/>
+            </a:p>
+          </p:txBody>
+        </p:sp>
+        <p:sp>
+          <p:nvSpPr>
+            <p:cNvPr id="4" name="TextBox 3">
+              <a:extLst>
+                <a:ext uri="{FF2B5EF4-FFF2-40B4-BE49-F238E27FC236}">
+                  <a16:creationId xmlns:a16="http://schemas.microsoft.com/office/drawing/2014/main" id="{0203A0F0-BEAC-7C0E-B83A-90FAC90AC841}"/>
+                </a:ext>
+              </a:extLst>
+            </p:cNvPr>
+            <p:cNvSpPr txBox="1"/>
+            <p:nvPr/>
+          </p:nvSpPr>
+          <p:spPr>
+            <a:xfrm>
+              <a:off x="381513" y="885014"/>
+              <a:ext cx="6509313" cy="4508927"/>
+            </a:xfrm>
+            <a:prstGeom prst="rect">
+              <a:avLst/>
+            </a:prstGeom>
+            <a:noFill/>
+          </p:spPr>
+          <p:txBody>
+            <a:bodyPr wrap="square" rtlCol="0">
+              <a:spAutoFit/>
+            </a:bodyPr>
+            <a:lstStyle/>
+            <a:p>
+              <a:r>
+                <a:rPr lang="en-US" sz="28700" dirty="0">
+                  <a:solidFill>
+                    <a:schemeClr val="bg1"/>
+                  </a:solidFill>
+                  <a:latin typeface="Bookman Old Style" panose="02050604050505020204" pitchFamily="18" charset="0"/>
+                </a:rPr>
+                <a:t>JE</a:t>
+              </a:r>
+            </a:p>
+          </p:txBody>
+        </p:sp>
+      </p:grpSp>
       <p:grpSp>
         <p:nvGrpSpPr>
           <p:cNvPr id="56" name="Group 55">

</xml_diff>